<commit_message>
Fixed some errors in game logic doc
Fixed some errors in game logic powerpoint file
</commit_message>
<xml_diff>
--- a/DOCUMENTATION/Game_Logic_Proposal 001.pptx
+++ b/DOCUMENTATION/Game_Logic_Proposal 001.pptx
@@ -3155,17 +3155,15 @@
                   <a:schemeClr val="tx1"/>
                 </a:solidFill>
               </a:rPr>
-              <a:t>The most important idea in this design the ‘group’ class. When you place a stone you either instantiate a new group (with only one position), append a new position to an existing group or append a new position to an existing group and merge that group with another group.</a:t>
-            </a:r>
-          </a:p>
-          <a:p>
+              <a:t>The most important idea in this </a:t>
+            </a:r>
             <a:r>
               <a:rPr lang="en-GB" sz="1300" dirty="0" smtClean="0">
                 <a:solidFill>
                   <a:schemeClr val="tx1"/>
                 </a:solidFill>
               </a:rPr>
-              <a:t>The point of this is to make finding the legality of ‘life and death’ type moves </a:t>
+              <a:t>design is </a:t>
             </a:r>
             <a:r>
               <a:rPr lang="en-GB" sz="1300" dirty="0" smtClean="0">
@@ -3173,15 +3171,17 @@
                   <a:schemeClr val="tx1"/>
                 </a:solidFill>
               </a:rPr>
-              <a:t>(when u place a stone in such a way that it renders one of your own and an opponents groups with 0 liberties, in this case the move is legal as the opponent group is killed) </a:t>
-            </a:r>
+              <a:t>the ‘group’ class. When you place a stone you either instantiate a new group (with only one position), append a new position to an existing group or append a new position to an existing group and merge that group with another group.</a:t>
+            </a:r>
+          </a:p>
+          <a:p>
             <a:r>
               <a:rPr lang="en-GB" sz="1300" dirty="0" smtClean="0">
                 <a:solidFill>
                   <a:schemeClr val="tx1"/>
                 </a:solidFill>
               </a:rPr>
-              <a:t>easier and also to save on massive amounts of recursive iteration that you would have to do to work out how many liberties a group has in total if each stone object only took care of itself</a:t>
+              <a:t>The point of this is to make finding the legality of ‘life and death’ type moves (when u place a stone in such a way that it renders one of your own and an opponents groups with 0 liberties, in this case the move is legal as the opponent group is killed) easier and also to save on massive amounts of recursive iteration that you would have to do to work out how many liberties a group has in total if each stone object only took care of itself</a:t>
             </a:r>
             <a:endParaRPr lang="en-GB" sz="1300" dirty="0">
               <a:solidFill>
@@ -4583,6 +4583,40 @@
               <a:t>class</a:t>
             </a:r>
             <a:endParaRPr lang="en-GB" sz="1200" dirty="0"/>
+          </a:p>
+        </p:txBody>
+      </p:sp>
+      <p:sp>
+        <p:nvSpPr>
+          <p:cNvPr id="40" name="TextBox 39"/>
+          <p:cNvSpPr txBox="1"/>
+          <p:nvPr/>
+        </p:nvSpPr>
+        <p:spPr>
+          <a:xfrm>
+            <a:off x="1621430" y="4185966"/>
+            <a:ext cx="1728192" cy="246221"/>
+          </a:xfrm>
+          <a:prstGeom prst="rect">
+            <a:avLst/>
+          </a:prstGeom>
+          <a:noFill/>
+        </p:spPr>
+        <p:txBody>
+          <a:bodyPr wrap="square" rtlCol="0">
+            <a:spAutoFit/>
+          </a:bodyPr>
+          <a:lstStyle/>
+          <a:p>
+            <a:r>
+              <a:rPr lang="en-GB" sz="1000" dirty="0" smtClean="0"/>
+              <a:t>This is a group with </a:t>
+            </a:r>
+            <a:r>
+              <a:rPr lang="en-GB" sz="1000" dirty="0" smtClean="0"/>
+              <a:t>1 position</a:t>
+            </a:r>
+            <a:endParaRPr lang="en-GB" sz="1000" dirty="0"/>
           </a:p>
         </p:txBody>
       </p:sp>
@@ -4640,11 +4674,7 @@
           <a:p>
             <a:r>
               <a:rPr lang="en-GB" sz="2400" dirty="0" smtClean="0"/>
-              <a:t> </a:t>
-            </a:r>
-            <a:r>
-              <a:rPr lang="en-GB" sz="2400" dirty="0" smtClean="0"/>
-              <a:t>Go game logic proposal 001 : Place stone function</a:t>
+              <a:t> Go game logic proposal 001 : Place stone function</a:t>
             </a:r>
             <a:endParaRPr lang="en-GB" sz="2400" dirty="0"/>
           </a:p>
@@ -5434,12 +5464,6 @@
               </a:rPr>
               <a:t>  Add stone and merge 2 or more groups?</a:t>
             </a:r>
-            <a:endParaRPr lang="en-GB" dirty="0" smtClean="0">
-              <a:solidFill>
-                <a:schemeClr val="tx1"/>
-              </a:solidFill>
-              <a:sym typeface="Wingdings" pitchFamily="2" charset="2"/>
-            </a:endParaRPr>
           </a:p>
         </p:txBody>
       </p:sp>

</xml_diff>